<commit_message>
Added graphic of implemented algorithms
</commit_message>
<xml_diff>
--- a/final/presentation_poster.pptx
+++ b/final/presentation_poster.pptx
@@ -231,6 +231,14 @@
     </p:ext>
   </p:extLst>
 </p:presentation>
+</file>
+
+<file path=ppt/revisionInfo.xml><?xml version="1.0" encoding="utf-8"?>
+<p1510:revInfo xmlns:a="http://schemas.openxmlformats.org/drawingml/2006/main" xmlns:r="http://schemas.openxmlformats.org/officeDocument/2006/relationships" xmlns:p1510="http://schemas.microsoft.com/office/powerpoint/2015/10/main">
+  <p1510:revLst>
+    <p1510:client id="{737BB19E-EE9B-48F6-AADA-1BCD1C462E4B}" v="7" dt="2020-12-08T05:31:09.551"/>
+  </p1510:revLst>
+</p1510:revInfo>
 </file>
 
 <file path=ppt/notesMasters/notesMaster1.xml><?xml version="1.0" encoding="utf-8"?>
@@ -3862,63 +3870,7 @@
                 </a:solidFill>
                 <a:latin typeface="+mn-lt"/>
               </a:rPr>
-              <a:t>	We use two primary model domains, continuous- and discrete-action space designed models:</a:t>
-            </a:r>
-          </a:p>
-          <a:p>
-            <a:pPr marL="914400" marR="0" lvl="0" indent="-914400" rtl="0">
-              <a:lnSpc>
-                <a:spcPct val="100000"/>
-              </a:lnSpc>
-              <a:spcBef>
-                <a:spcPts val="0"/>
-              </a:spcBef>
-              <a:spcAft>
-                <a:spcPts val="0"/>
-              </a:spcAft>
-              <a:buClr>
-                <a:schemeClr val="dk1"/>
-              </a:buClr>
-              <a:buSzPct val="25000"/>
-              <a:buFont typeface="Arial"/>
-              <a:buAutoNum type="arabicPeriod"/>
-            </a:pPr>
-            <a:r>
-              <a:rPr lang="en-US" sz="4800" dirty="0">
-                <a:solidFill>
-                  <a:schemeClr val="dk1"/>
-                </a:solidFill>
-                <a:latin typeface="+mn-lt"/>
-              </a:rPr>
-              <a:t>DQN, Dueling DQN, Double DQN</a:t>
-            </a:r>
-          </a:p>
-          <a:p>
-            <a:pPr marL="914400" marR="0" lvl="0" indent="-914400" rtl="0">
-              <a:lnSpc>
-                <a:spcPct val="100000"/>
-              </a:lnSpc>
-              <a:spcBef>
-                <a:spcPts val="0"/>
-              </a:spcBef>
-              <a:spcAft>
-                <a:spcPts val="0"/>
-              </a:spcAft>
-              <a:buClr>
-                <a:schemeClr val="dk1"/>
-              </a:buClr>
-              <a:buSzPct val="25000"/>
-              <a:buFont typeface="Arial"/>
-              <a:buAutoNum type="arabicPeriod"/>
-            </a:pPr>
-            <a:r>
-              <a:rPr lang="en-US" sz="4800" dirty="0">
-                <a:solidFill>
-                  <a:schemeClr val="dk1"/>
-                </a:solidFill>
-                <a:latin typeface="+mn-lt"/>
-              </a:rPr>
-              <a:t>REINFORCE, PPO, MC</a:t>
+              <a:t>	</a:t>
             </a:r>
           </a:p>
           <a:p>
@@ -4973,7 +4925,7 @@
         </p:blipFill>
         <p:spPr>
           <a:xfrm>
-            <a:off x="535078" y="20949687"/>
+            <a:off x="446588" y="26347597"/>
             <a:ext cx="11483036" cy="1249259"/>
           </a:xfrm>
           <a:prstGeom prst="rect">
@@ -5367,6 +5319,36 @@
           </a:p>
         </p:txBody>
       </p:sp>
+      <p:pic>
+        <p:nvPicPr>
+          <p:cNvPr id="6" name="Picture 7" descr="Diagram, venn diagram&#10;&#10;Description automatically generated">
+            <a:extLst>
+              <a:ext uri="{FF2B5EF4-FFF2-40B4-BE49-F238E27FC236}">
+                <a16:creationId xmlns:a16="http://schemas.microsoft.com/office/drawing/2014/main" id="{42E5FCD0-3660-4822-BCD1-92B11EF20E30}"/>
+              </a:ext>
+            </a:extLst>
+          </p:cNvPr>
+          <p:cNvPicPr>
+            <a:picLocks noChangeAspect="1"/>
+          </p:cNvPicPr>
+          <p:nvPr/>
+        </p:nvPicPr>
+        <p:blipFill>
+          <a:blip r:embed="rId10"/>
+          <a:stretch>
+            <a:fillRect/>
+          </a:stretch>
+        </p:blipFill>
+        <p:spPr>
+          <a:xfrm>
+            <a:off x="1150374" y="17148136"/>
+            <a:ext cx="9999406" cy="6497766"/>
+          </a:xfrm>
+          <a:prstGeom prst="rect">
+            <a:avLst/>
+          </a:prstGeom>
+        </p:spPr>
+      </p:pic>
     </p:spTree>
   </p:cSld>
   <p:clrMapOvr>

</xml_diff>

<commit_message>
Added typical run of A2C solving mountain car
</commit_message>
<xml_diff>
--- a/final/presentation_poster.pptx
+++ b/final/presentation_poster.pptx
@@ -236,7 +236,7 @@
 <file path=ppt/revisionInfo.xml><?xml version="1.0" encoding="utf-8"?>
 <p1510:revInfo xmlns:a="http://schemas.openxmlformats.org/drawingml/2006/main" xmlns:r="http://schemas.openxmlformats.org/officeDocument/2006/relationships" xmlns:p1510="http://schemas.microsoft.com/office/powerpoint/2015/10/main">
   <p1510:revLst>
-    <p1510:client id="{737BB19E-EE9B-48F6-AADA-1BCD1C462E4B}" v="7" dt="2020-12-08T05:31:09.551"/>
+    <p1510:client id="{737BB19E-EE9B-48F6-AADA-1BCD1C462E4B}" v="21" dt="2020-12-08T06:30:55.529"/>
   </p1510:revLst>
 </p1510:revInfo>
 </file>
@@ -4905,66 +4905,6 @@
       </p:sp>
       <p:pic>
         <p:nvPicPr>
-          <p:cNvPr id="3" name="Picture 2" descr="Table&#10;&#10;Description automatically generated">
-            <a:extLst>
-              <a:ext uri="{FF2B5EF4-FFF2-40B4-BE49-F238E27FC236}">
-                <a16:creationId xmlns:a16="http://schemas.microsoft.com/office/drawing/2014/main" id="{FED1A48B-7EA2-4670-8E8D-24D9F0E98C58}"/>
-              </a:ext>
-            </a:extLst>
-          </p:cNvPr>
-          <p:cNvPicPr>
-            <a:picLocks noChangeAspect="1"/>
-          </p:cNvPicPr>
-          <p:nvPr/>
-        </p:nvPicPr>
-        <p:blipFill>
-          <a:blip r:embed="rId4"/>
-          <a:stretch>
-            <a:fillRect/>
-          </a:stretch>
-        </p:blipFill>
-        <p:spPr>
-          <a:xfrm>
-            <a:off x="446588" y="26347597"/>
-            <a:ext cx="11483036" cy="1249259"/>
-          </a:xfrm>
-          <a:prstGeom prst="rect">
-            <a:avLst/>
-          </a:prstGeom>
-        </p:spPr>
-      </p:pic>
-      <p:pic>
-        <p:nvPicPr>
-          <p:cNvPr id="5" name="Picture 4" descr="Shape&#10;&#10;Description automatically generated">
-            <a:extLst>
-              <a:ext uri="{FF2B5EF4-FFF2-40B4-BE49-F238E27FC236}">
-                <a16:creationId xmlns:a16="http://schemas.microsoft.com/office/drawing/2014/main" id="{BD2D1ACA-99C3-4FD4-A6B1-702F74912C09}"/>
-              </a:ext>
-            </a:extLst>
-          </p:cNvPr>
-          <p:cNvPicPr>
-            <a:picLocks noChangeAspect="1"/>
-          </p:cNvPicPr>
-          <p:nvPr/>
-        </p:nvPicPr>
-        <p:blipFill>
-          <a:blip r:embed="rId5"/>
-          <a:stretch>
-            <a:fillRect/>
-          </a:stretch>
-        </p:blipFill>
-        <p:spPr>
-          <a:xfrm>
-            <a:off x="5936236" y="27236481"/>
-            <a:ext cx="5356015" cy="3504696"/>
-          </a:xfrm>
-          <a:prstGeom prst="rect">
-            <a:avLst/>
-          </a:prstGeom>
-        </p:spPr>
-      </p:pic>
-      <p:pic>
-        <p:nvPicPr>
           <p:cNvPr id="7" name="Picture 6" descr="Graphical user interface, application&#10;&#10;Description automatically generated">
             <a:extLst>
               <a:ext uri="{FF2B5EF4-FFF2-40B4-BE49-F238E27FC236}">
@@ -4978,7 +4918,7 @@
           <p:nvPr/>
         </p:nvPicPr>
         <p:blipFill>
-          <a:blip r:embed="rId6"/>
+          <a:blip r:embed="rId4"/>
           <a:stretch>
             <a:fillRect/>
           </a:stretch>
@@ -5008,7 +4948,7 @@
           <p:nvPr/>
         </p:nvPicPr>
         <p:blipFill>
-          <a:blip r:embed="rId6"/>
+          <a:blip r:embed="rId4"/>
           <a:stretch>
             <a:fillRect/>
           </a:stretch>
@@ -5038,7 +4978,7 @@
           <p:nvPr/>
         </p:nvPicPr>
         <p:blipFill>
-          <a:blip r:embed="rId6"/>
+          <a:blip r:embed="rId4"/>
           <a:stretch>
             <a:fillRect/>
           </a:stretch>
@@ -5068,7 +5008,7 @@
           <p:nvPr/>
         </p:nvPicPr>
         <p:blipFill>
-          <a:blip r:embed="rId6"/>
+          <a:blip r:embed="rId4"/>
           <a:stretch>
             <a:fillRect/>
           </a:stretch>
@@ -5098,14 +5038,14 @@
           <p:nvPr/>
         </p:nvPicPr>
         <p:blipFill>
-          <a:blip r:embed="rId6"/>
+          <a:blip r:embed="rId4"/>
           <a:stretch>
             <a:fillRect/>
           </a:stretch>
         </p:blipFill>
         <p:spPr>
           <a:xfrm>
-            <a:off x="23343391" y="21493475"/>
+            <a:off x="24936217" y="20874043"/>
             <a:ext cx="4334480" cy="6087325"/>
           </a:xfrm>
           <a:prstGeom prst="rect">
@@ -5128,7 +5068,7 @@
           <p:nvPr/>
         </p:nvPicPr>
         <p:blipFill>
-          <a:blip r:embed="rId6"/>
+          <a:blip r:embed="rId4"/>
           <a:stretch>
             <a:fillRect/>
           </a:stretch>
@@ -5158,7 +5098,7 @@
           <p:nvPr/>
         </p:nvPicPr>
         <p:blipFill>
-          <a:blip r:embed="rId7">
+          <a:blip r:embed="rId5">
             <a:extLst>
               <a:ext uri="{28A0092B-C50C-407E-A947-70E740481C1C}">
                 <a14:useLocalDpi xmlns:a14="http://schemas.microsoft.com/office/drawing/2010/main" val="0"/>
@@ -5205,7 +5145,7 @@
           <p:nvPr/>
         </p:nvPicPr>
         <p:blipFill>
-          <a:blip r:embed="rId8">
+          <a:blip r:embed="rId6">
             <a:extLst>
               <a:ext uri="{28A0092B-C50C-407E-A947-70E740481C1C}">
                 <a14:useLocalDpi xmlns:a14="http://schemas.microsoft.com/office/drawing/2010/main" val="0"/>
@@ -5252,7 +5192,7 @@
           <p:nvPr/>
         </p:nvPicPr>
         <p:blipFill>
-          <a:blip r:embed="rId9">
+          <a:blip r:embed="rId7">
             <a:extLst>
               <a:ext uri="{28A0092B-C50C-407E-A947-70E740481C1C}">
                 <a14:useLocalDpi xmlns:a14="http://schemas.microsoft.com/office/drawing/2010/main" val="0"/>
@@ -5334,7 +5274,7 @@
           <p:nvPr/>
         </p:nvPicPr>
         <p:blipFill>
-          <a:blip r:embed="rId10"/>
+          <a:blip r:embed="rId8"/>
           <a:stretch>
             <a:fillRect/>
           </a:stretch>
@@ -5343,6 +5283,36 @@
           <a:xfrm>
             <a:off x="1150374" y="17148136"/>
             <a:ext cx="9999406" cy="6497766"/>
+          </a:xfrm>
+          <a:prstGeom prst="rect">
+            <a:avLst/>
+          </a:prstGeom>
+        </p:spPr>
+      </p:pic>
+      <p:pic>
+        <p:nvPicPr>
+          <p:cNvPr id="8" name="Picture 9" descr="Diagram&#10;&#10;Description automatically generated">
+            <a:extLst>
+              <a:ext uri="{FF2B5EF4-FFF2-40B4-BE49-F238E27FC236}">
+                <a16:creationId xmlns:a16="http://schemas.microsoft.com/office/drawing/2014/main" id="{085A9D5B-9E75-45ED-B073-0512629635B1}"/>
+              </a:ext>
+            </a:extLst>
+          </p:cNvPr>
+          <p:cNvPicPr>
+            <a:picLocks noChangeAspect="1"/>
+          </p:cNvPicPr>
+          <p:nvPr/>
+        </p:nvPicPr>
+        <p:blipFill>
+          <a:blip r:embed="rId9"/>
+          <a:stretch>
+            <a:fillRect/>
+          </a:stretch>
+        </p:blipFill>
+        <p:spPr>
+          <a:xfrm>
+            <a:off x="6194322" y="26241529"/>
+            <a:ext cx="4601496" cy="5124142"/>
           </a:xfrm>
           <a:prstGeom prst="rect">
             <a:avLst/>

</xml_diff>

<commit_message>
Added in mountain car results
</commit_message>
<xml_diff>
--- a/final/presentation_poster.pptx
+++ b/final/presentation_poster.pptx
@@ -237,6 +237,7 @@
 <p1510:revInfo xmlns:a="http://schemas.openxmlformats.org/drawingml/2006/main" xmlns:r="http://schemas.openxmlformats.org/officeDocument/2006/relationships" xmlns:p1510="http://schemas.microsoft.com/office/powerpoint/2015/10/main">
   <p1510:revLst>
     <p1510:client id="{737BB19E-EE9B-48F6-AADA-1BCD1C462E4B}" v="21" dt="2020-12-08T06:30:55.529"/>
+    <p1510:client id="{966A8B95-43F3-278D-101C-CCD05A2D0637}" v="206" dt="2020-12-09T14:23:19.403"/>
   </p1510:revLst>
 </p1510:revInfo>
 </file>
@@ -4543,54 +4544,15 @@
               </a:rPr>
               <a:t>Last, we propose standards for how benchmarking research should be done based on our experience with the process of model comparison.</a:t>
             </a:r>
-            <a:endParaRPr lang="en-US" sz="4800" dirty="0">
+            <a:endParaRPr lang="en-US" sz="4800" i="0" u="none" strike="noStrike" cap="none" dirty="0">
               <a:solidFill>
                 <a:schemeClr val="dk1"/>
               </a:solidFill>
               <a:latin typeface="+mn-lt"/>
+              <a:ea typeface="Arial"/>
+              <a:cs typeface="Arial"/>
+              <a:sym typeface="Arial"/>
             </a:endParaRPr>
-          </a:p>
-          <a:p>
-            <a:pPr marL="0" marR="0" lvl="0" indent="0" rtl="0">
-              <a:lnSpc>
-                <a:spcPct val="120000"/>
-              </a:lnSpc>
-              <a:spcBef>
-                <a:spcPts val="0"/>
-              </a:spcBef>
-              <a:spcAft>
-                <a:spcPts val="0"/>
-              </a:spcAft>
-              <a:buClr>
-                <a:srgbClr val="000000"/>
-              </a:buClr>
-              <a:buFont typeface="Arial"/>
-              <a:buNone/>
-            </a:pPr>
-            <a:r>
-              <a:rPr lang="en-US" sz="4800" b="1" i="0" u="none" strike="noStrike" cap="none" dirty="0">
-                <a:solidFill>
-                  <a:schemeClr val="dk1"/>
-                </a:solidFill>
-                <a:latin typeface="+mn-lt"/>
-                <a:ea typeface="Arial"/>
-                <a:cs typeface="Arial"/>
-                <a:sym typeface="Arial"/>
-              </a:rPr>
-              <a:t>Rainbow</a:t>
-            </a:r>
-            <a:r>
-              <a:rPr lang="en-US" sz="4800" i="0" u="none" strike="noStrike" cap="none" dirty="0">
-                <a:solidFill>
-                  <a:schemeClr val="dk1"/>
-                </a:solidFill>
-                <a:latin typeface="+mn-lt"/>
-                <a:ea typeface="Arial"/>
-                <a:cs typeface="Arial"/>
-                <a:sym typeface="Arial"/>
-              </a:rPr>
-              <a:t>, part of our inspiration:</a:t>
-            </a:r>
           </a:p>
         </p:txBody>
       </p:sp>
@@ -4878,87 +4840,113 @@
             </a:endParaRPr>
           </a:p>
           <a:p>
-            <a:pPr marL="0" marR="0" lvl="0" indent="0" rtl="0">
-              <a:lnSpc>
-                <a:spcPct val="100000"/>
-              </a:lnSpc>
-              <a:spcBef>
-                <a:spcPts val="0"/>
-              </a:spcBef>
-              <a:spcAft>
-                <a:spcPts val="0"/>
-              </a:spcAft>
+            <a:pPr>
               <a:buClr>
                 <a:srgbClr val="000000"/>
               </a:buClr>
-              <a:buFont typeface="Arial"/>
-              <a:buNone/>
             </a:pPr>
-            <a:endParaRPr lang="en-US" sz="7200" dirty="0">
+            <a:r>
+              <a:rPr lang="en-US" sz="4800" dirty="0">
+                <a:solidFill>
+                  <a:schemeClr val="dk1"/>
+                </a:solidFill>
+                <a:latin typeface="+mn-lt"/>
+                <a:ea typeface="Cambria"/>
+                <a:cs typeface="Cambria"/>
+              </a:rPr>
+              <a:t>Here we have results on the mountain</a:t>
+            </a:r>
+            <a:br>
+              <a:rPr lang="en-US" sz="4800" dirty="0">
+                <a:solidFill>
+                  <a:schemeClr val="dk1"/>
+                </a:solidFill>
+                <a:latin typeface="+mn-lt"/>
+                <a:ea typeface="Cambria"/>
+                <a:cs typeface="Cambria"/>
+              </a:rPr>
+            </a:br>
+            <a:r>
+              <a:rPr lang="en-US" sz="4800" dirty="0">
+                <a:solidFill>
+                  <a:schemeClr val="dk1"/>
+                </a:solidFill>
+                <a:latin typeface="+mn-lt"/>
+                <a:ea typeface="Cambria"/>
+                <a:cs typeface="Cambria"/>
+              </a:rPr>
+              <a:t>car task.  The models that we trained</a:t>
+            </a:r>
+            <a:br>
+              <a:rPr lang="en-US" sz="4800" dirty="0">
+                <a:solidFill>
+                  <a:schemeClr val="dk1"/>
+                </a:solidFill>
+                <a:latin typeface="+mn-lt"/>
+                <a:ea typeface="Cambria"/>
+                <a:cs typeface="Cambria"/>
+              </a:rPr>
+            </a:br>
+            <a:r>
+              <a:rPr lang="en-US" sz="4800" dirty="0">
+                <a:solidFill>
+                  <a:schemeClr val="dk1"/>
+                </a:solidFill>
+                <a:latin typeface="+mn-lt"/>
+                <a:ea typeface="Cambria"/>
+                <a:cs typeface="Cambria"/>
+              </a:rPr>
+              <a:t>and tested found different solutions to</a:t>
+            </a:r>
+            <a:br>
+              <a:rPr lang="en-US" sz="4800" dirty="0">
+                <a:solidFill>
+                  <a:schemeClr val="dk1"/>
+                </a:solidFill>
+                <a:latin typeface="+mn-lt"/>
+                <a:ea typeface="Cambria"/>
+                <a:cs typeface="Cambria"/>
+              </a:rPr>
+            </a:br>
+            <a:r>
+              <a:rPr lang="en-US" sz="4800" dirty="0">
+                <a:solidFill>
+                  <a:schemeClr val="dk1"/>
+                </a:solidFill>
+                <a:latin typeface="+mn-lt"/>
+                <a:ea typeface="Cambria"/>
+                <a:cs typeface="Cambria"/>
+              </a:rPr>
+              <a:t>the problem and converged at</a:t>
+            </a:r>
+            <a:br>
+              <a:rPr lang="en-US" sz="4800" dirty="0">
+                <a:solidFill>
+                  <a:schemeClr val="dk1"/>
+                </a:solidFill>
+                <a:latin typeface="+mn-lt"/>
+                <a:ea typeface="Cambria"/>
+                <a:cs typeface="Cambria"/>
+              </a:rPr>
+            </a:br>
+            <a:r>
+              <a:rPr lang="en-US" sz="4800" dirty="0">
+                <a:solidFill>
+                  <a:schemeClr val="dk1"/>
+                </a:solidFill>
+                <a:latin typeface="+mn-lt"/>
+                <a:ea typeface="Cambria"/>
+                <a:cs typeface="Cambria"/>
+              </a:rPr>
+              <a:t>different rates during training.</a:t>
+            </a:r>
+            <a:endParaRPr lang="en-US" dirty="0">
               <a:solidFill>
                 <a:schemeClr val="dk1"/>
               </a:solidFill>
               <a:latin typeface="+mn-lt"/>
               <a:ea typeface="Cambria"/>
               <a:cs typeface="Cambria"/>
-              <a:sym typeface="Cambria"/>
-            </a:endParaRPr>
-          </a:p>
-          <a:p>
-            <a:pPr marL="0" marR="0" lvl="0" indent="0" rtl="0">
-              <a:lnSpc>
-                <a:spcPct val="100000"/>
-              </a:lnSpc>
-              <a:spcBef>
-                <a:spcPts val="0"/>
-              </a:spcBef>
-              <a:spcAft>
-                <a:spcPts val="0"/>
-              </a:spcAft>
-              <a:buClr>
-                <a:srgbClr val="000000"/>
-              </a:buClr>
-              <a:buFont typeface="Arial"/>
-              <a:buNone/>
-            </a:pPr>
-            <a:r>
-              <a:rPr lang="en-US" sz="4800" dirty="0">
-                <a:solidFill>
-                  <a:schemeClr val="dk1"/>
-                </a:solidFill>
-                <a:latin typeface="+mn-lt"/>
-                <a:ea typeface="Cambria"/>
-                <a:cs typeface="Cambria"/>
-                <a:sym typeface="Cambria"/>
-              </a:rPr>
-              <a:t>Here is a topic sentence for these results. Here is another sentence introducing the plots. This discussion can continue until the end of the bubble</a:t>
-            </a:r>
-          </a:p>
-          <a:p>
-            <a:pPr marL="0" marR="0" lvl="0" indent="0" algn="ctr" rtl="0">
-              <a:lnSpc>
-                <a:spcPct val="100000"/>
-              </a:lnSpc>
-              <a:spcBef>
-                <a:spcPts val="0"/>
-              </a:spcBef>
-              <a:spcAft>
-                <a:spcPts val="0"/>
-              </a:spcAft>
-              <a:buClr>
-                <a:srgbClr val="000000"/>
-              </a:buClr>
-              <a:buFont typeface="Arial"/>
-              <a:buNone/>
-            </a:pPr>
-            <a:endParaRPr sz="7200" b="1" i="0" u="none" strike="noStrike" cap="none" dirty="0">
-              <a:solidFill>
-                <a:schemeClr val="dk1"/>
-              </a:solidFill>
-              <a:latin typeface="+mn-lt"/>
-              <a:ea typeface="Arial"/>
-              <a:cs typeface="Arial"/>
-              <a:sym typeface="Arial"/>
             </a:endParaRPr>
           </a:p>
         </p:txBody>
@@ -4993,147 +4981,6 @@
           </a:prstGeom>
         </p:spPr>
       </p:pic>
-      <p:pic>
-        <p:nvPicPr>
-          <p:cNvPr id="1026" name="Picture 2">
-            <a:extLst>
-              <a:ext uri="{FF2B5EF4-FFF2-40B4-BE49-F238E27FC236}">
-                <a16:creationId xmlns:a16="http://schemas.microsoft.com/office/drawing/2014/main" id="{7AE4124A-53F5-4251-A608-09E11A5783D6}"/>
-              </a:ext>
-            </a:extLst>
-          </p:cNvPr>
-          <p:cNvPicPr>
-            <a:picLocks noChangeAspect="1" noChangeArrowheads="1"/>
-          </p:cNvPicPr>
-          <p:nvPr/>
-        </p:nvPicPr>
-        <p:blipFill>
-          <a:blip r:embed="rId5">
-            <a:extLst>
-              <a:ext uri="{28A0092B-C50C-407E-A947-70E740481C1C}">
-                <a14:useLocalDpi xmlns:a14="http://schemas.microsoft.com/office/drawing/2010/main" val="0"/>
-              </a:ext>
-            </a:extLst>
-          </a:blip>
-          <a:srcRect/>
-          <a:stretch>
-            <a:fillRect/>
-          </a:stretch>
-        </p:blipFill>
-        <p:spPr bwMode="auto">
-          <a:xfrm>
-            <a:off x="25694068" y="24669920"/>
-            <a:ext cx="6096000" cy="4572000"/>
-          </a:xfrm>
-          <a:prstGeom prst="rect">
-            <a:avLst/>
-          </a:prstGeom>
-          <a:noFill/>
-          <a:extLst>
-            <a:ext uri="{909E8E84-426E-40DD-AFC4-6F175D3DCCD1}">
-              <a14:hiddenFill xmlns:a14="http://schemas.microsoft.com/office/drawing/2010/main">
-                <a:solidFill>
-                  <a:srgbClr val="FFFFFF"/>
-                </a:solidFill>
-              </a14:hiddenFill>
-            </a:ext>
-          </a:extLst>
-        </p:spPr>
-      </p:pic>
-      <p:pic>
-        <p:nvPicPr>
-          <p:cNvPr id="1028" name="Picture 4">
-            <a:extLst>
-              <a:ext uri="{FF2B5EF4-FFF2-40B4-BE49-F238E27FC236}">
-                <a16:creationId xmlns:a16="http://schemas.microsoft.com/office/drawing/2014/main" id="{A7B3AD53-5382-4C25-965D-322B90E5023B}"/>
-              </a:ext>
-            </a:extLst>
-          </p:cNvPr>
-          <p:cNvPicPr>
-            <a:picLocks noChangeAspect="1" noChangeArrowheads="1"/>
-          </p:cNvPicPr>
-          <p:nvPr/>
-        </p:nvPicPr>
-        <p:blipFill>
-          <a:blip r:embed="rId6">
-            <a:extLst>
-              <a:ext uri="{28A0092B-C50C-407E-A947-70E740481C1C}">
-                <a14:useLocalDpi xmlns:a14="http://schemas.microsoft.com/office/drawing/2010/main" val="0"/>
-              </a:ext>
-            </a:extLst>
-          </a:blip>
-          <a:srcRect/>
-          <a:stretch>
-            <a:fillRect/>
-          </a:stretch>
-        </p:blipFill>
-        <p:spPr bwMode="auto">
-          <a:xfrm>
-            <a:off x="25551322" y="20225889"/>
-            <a:ext cx="6096000" cy="4572000"/>
-          </a:xfrm>
-          <a:prstGeom prst="rect">
-            <a:avLst/>
-          </a:prstGeom>
-          <a:noFill/>
-          <a:extLst>
-            <a:ext uri="{909E8E84-426E-40DD-AFC4-6F175D3DCCD1}">
-              <a14:hiddenFill xmlns:a14="http://schemas.microsoft.com/office/drawing/2010/main">
-                <a:solidFill>
-                  <a:srgbClr val="FFFFFF"/>
-                </a:solidFill>
-              </a14:hiddenFill>
-            </a:ext>
-          </a:extLst>
-        </p:spPr>
-      </p:pic>
-      <p:pic>
-        <p:nvPicPr>
-          <p:cNvPr id="2" name="Picture 2">
-            <a:extLst>
-              <a:ext uri="{FF2B5EF4-FFF2-40B4-BE49-F238E27FC236}">
-                <a16:creationId xmlns:a16="http://schemas.microsoft.com/office/drawing/2014/main" id="{0217C5AC-EA8A-45BB-94BF-515F1B14F14A}"/>
-              </a:ext>
-            </a:extLst>
-          </p:cNvPr>
-          <p:cNvPicPr>
-            <a:picLocks noChangeAspect="1" noChangeArrowheads="1"/>
-          </p:cNvPicPr>
-          <p:nvPr/>
-        </p:nvPicPr>
-        <p:blipFill>
-          <a:blip r:embed="rId7">
-            <a:extLst>
-              <a:ext uri="{28A0092B-C50C-407E-A947-70E740481C1C}">
-                <a14:useLocalDpi xmlns:a14="http://schemas.microsoft.com/office/drawing/2010/main" val="0"/>
-              </a:ext>
-            </a:extLst>
-          </a:blip>
-          <a:srcRect/>
-          <a:stretch>
-            <a:fillRect/>
-          </a:stretch>
-        </p:blipFill>
-        <p:spPr bwMode="auto">
-          <a:xfrm>
-            <a:off x="38587289" y="21709953"/>
-            <a:ext cx="4420625" cy="5337402"/>
-          </a:xfrm>
-          <a:prstGeom prst="rect">
-            <a:avLst/>
-          </a:prstGeom>
-          <a:noFill/>
-          <a:extLst>
-            <a:ext uri="{909E8E84-426E-40DD-AFC4-6F175D3DCCD1}">
-              <a14:hiddenFill xmlns:a14="http://schemas.microsoft.com/office/drawing/2010/main">
-                <a:solidFill>
-                  <a:srgbClr val="FFFFFF"/>
-                </a:solidFill>
-              </a14:hiddenFill>
-            </a:ext>
-          </a:extLst>
-        </p:spPr>
-      </p:pic>
       <p:sp>
         <p:nvSpPr>
           <p:cNvPr id="4" name="TextBox 3">
@@ -5184,7 +5031,7 @@
           <p:nvPr/>
         </p:nvPicPr>
         <p:blipFill>
-          <a:blip r:embed="rId8"/>
+          <a:blip r:embed="rId5"/>
           <a:stretch>
             <a:fillRect/>
           </a:stretch>
@@ -5214,7 +5061,7 @@
           <p:nvPr/>
         </p:nvPicPr>
         <p:blipFill>
-          <a:blip r:embed="rId9"/>
+          <a:blip r:embed="rId6"/>
           <a:stretch>
             <a:fillRect/>
           </a:stretch>
@@ -5223,36 +5070,6 @@
           <a:xfrm>
             <a:off x="6194322" y="26241529"/>
             <a:ext cx="4601496" cy="5124142"/>
-          </a:xfrm>
-          <a:prstGeom prst="rect">
-            <a:avLst/>
-          </a:prstGeom>
-        </p:spPr>
-      </p:pic>
-      <p:pic>
-        <p:nvPicPr>
-          <p:cNvPr id="5" name="Picture 4" descr="Chart, line chart&#10;&#10;Description automatically generated">
-            <a:extLst>
-              <a:ext uri="{FF2B5EF4-FFF2-40B4-BE49-F238E27FC236}">
-                <a16:creationId xmlns:a16="http://schemas.microsoft.com/office/drawing/2014/main" id="{9C88683D-20E1-4723-8CB1-53BC7745BAAE}"/>
-              </a:ext>
-            </a:extLst>
-          </p:cNvPr>
-          <p:cNvPicPr>
-            <a:picLocks noChangeAspect="1"/>
-          </p:cNvPicPr>
-          <p:nvPr/>
-        </p:nvPicPr>
-        <p:blipFill>
-          <a:blip r:embed="rId10"/>
-          <a:stretch>
-            <a:fillRect/>
-          </a:stretch>
-        </p:blipFill>
-        <p:spPr>
-          <a:xfrm>
-            <a:off x="19460178" y="24852791"/>
-            <a:ext cx="5852172" cy="4389129"/>
           </a:xfrm>
           <a:prstGeom prst="rect">
             <a:avLst/>
@@ -5274,15 +5091,15 @@
           <p:nvPr/>
         </p:nvPicPr>
         <p:blipFill>
-          <a:blip r:embed="rId11"/>
+          <a:blip r:embed="rId7"/>
           <a:stretch>
             <a:fillRect/>
           </a:stretch>
         </p:blipFill>
         <p:spPr>
           <a:xfrm>
-            <a:off x="19317432" y="20482766"/>
-            <a:ext cx="5852172" cy="4389129"/>
+            <a:off x="38431340" y="22429553"/>
+            <a:ext cx="4967269" cy="3725452"/>
           </a:xfrm>
           <a:prstGeom prst="rect">
             <a:avLst/>
@@ -5304,7 +5121,7 @@
           <p:nvPr/>
         </p:nvPicPr>
         <p:blipFill>
-          <a:blip r:embed="rId12"/>
+          <a:blip r:embed="rId8"/>
           <a:stretch>
             <a:fillRect/>
           </a:stretch>
@@ -5317,88 +5134,6 @@
           <a:prstGeom prst="rect">
             <a:avLst/>
           </a:prstGeom>
-        </p:spPr>
-      </p:pic>
-      <p:sp>
-        <p:nvSpPr>
-          <p:cNvPr id="12" name="TextBox 11">
-            <a:extLst>
-              <a:ext uri="{FF2B5EF4-FFF2-40B4-BE49-F238E27FC236}">
-                <a16:creationId xmlns:a16="http://schemas.microsoft.com/office/drawing/2014/main" id="{2E5D63A6-4874-44A3-8E2C-B332FF15D961}"/>
-              </a:ext>
-            </a:extLst>
-          </p:cNvPr>
-          <p:cNvSpPr txBox="1"/>
-          <p:nvPr/>
-        </p:nvSpPr>
-        <p:spPr>
-          <a:xfrm>
-            <a:off x="14281705" y="24615258"/>
-            <a:ext cx="5852172" cy="2308324"/>
-          </a:xfrm>
-          <a:prstGeom prst="rect">
-            <a:avLst/>
-          </a:prstGeom>
-          <a:noFill/>
-        </p:spPr>
-        <p:txBody>
-          <a:bodyPr wrap="square" rtlCol="0">
-            <a:spAutoFit/>
-          </a:bodyPr>
-          <a:lstStyle/>
-          <a:p>
-            <a:r>
-              <a:rPr lang="en-US" sz="4800" dirty="0"/>
-              <a:t>DQN Family on Discrete MountainCar-v0</a:t>
-            </a:r>
-          </a:p>
-        </p:txBody>
-      </p:sp>
-      <p:pic>
-        <p:nvPicPr>
-          <p:cNvPr id="15" name="Picture 2">
-            <a:extLst>
-              <a:ext uri="{FF2B5EF4-FFF2-40B4-BE49-F238E27FC236}">
-                <a16:creationId xmlns:a16="http://schemas.microsoft.com/office/drawing/2014/main" id="{599E9E9B-41B5-4195-831D-07E01B481EA2}"/>
-              </a:ext>
-            </a:extLst>
-          </p:cNvPr>
-          <p:cNvPicPr>
-            <a:picLocks noChangeAspect="1" noChangeArrowheads="1"/>
-          </p:cNvPicPr>
-          <p:nvPr/>
-        </p:nvPicPr>
-        <p:blipFill>
-          <a:blip r:embed="rId13">
-            <a:extLst>
-              <a:ext uri="{28A0092B-C50C-407E-A947-70E740481C1C}">
-                <a14:useLocalDpi xmlns:a14="http://schemas.microsoft.com/office/drawing/2010/main" val="0"/>
-              </a:ext>
-            </a:extLst>
-          </a:blip>
-          <a:srcRect/>
-          <a:stretch>
-            <a:fillRect/>
-          </a:stretch>
-        </p:blipFill>
-        <p:spPr bwMode="auto">
-          <a:xfrm>
-            <a:off x="8071900" y="36518060"/>
-            <a:ext cx="3819525" cy="2647950"/>
-          </a:xfrm>
-          <a:prstGeom prst="rect">
-            <a:avLst/>
-          </a:prstGeom>
-          <a:noFill/>
-          <a:extLst>
-            <a:ext uri="{909E8E84-426E-40DD-AFC4-6F175D3DCCD1}">
-              <a14:hiddenFill xmlns:a14="http://schemas.microsoft.com/office/drawing/2010/main">
-                <a:solidFill>
-                  <a:srgbClr val="FFFFFF"/>
-                </a:solidFill>
-              </a14:hiddenFill>
-            </a:ext>
-          </a:extLst>
         </p:spPr>
       </p:pic>
       <p:pic>
@@ -5416,7 +5151,7 @@
           <p:nvPr/>
         </p:nvPicPr>
         <p:blipFill>
-          <a:blip r:embed="rId14"/>
+          <a:blip r:embed="rId9"/>
           <a:stretch>
             <a:fillRect/>
           </a:stretch>
@@ -5446,7 +5181,7 @@
           <p:nvPr/>
         </p:nvPicPr>
         <p:blipFill>
-          <a:blip r:embed="rId15"/>
+          <a:blip r:embed="rId10"/>
           <a:stretch>
             <a:fillRect/>
           </a:stretch>
@@ -5476,7 +5211,7 @@
           <p:nvPr/>
         </p:nvPicPr>
         <p:blipFill>
-          <a:blip r:embed="rId16">
+          <a:blip r:embed="rId11">
             <a:extLst>
               <a:ext uri="{28A0092B-C50C-407E-A947-70E740481C1C}">
                 <a14:useLocalDpi xmlns:a14="http://schemas.microsoft.com/office/drawing/2010/main" val="0"/>
@@ -5490,8 +5225,8 @@
         </p:blipFill>
         <p:spPr bwMode="auto">
           <a:xfrm>
-            <a:off x="12815470" y="20464889"/>
-            <a:ext cx="6732838" cy="4667653"/>
+            <a:off x="23478553" y="26836193"/>
+            <a:ext cx="8015947" cy="5641046"/>
           </a:xfrm>
           <a:prstGeom prst="rect">
             <a:avLst/>
@@ -5506,6 +5241,66 @@
               </a14:hiddenFill>
             </a:ext>
           </a:extLst>
+        </p:spPr>
+      </p:pic>
+      <p:pic>
+        <p:nvPicPr>
+          <p:cNvPr id="9" name="Picture 9" descr="Chart, histogram&#10;&#10;Description automatically generated">
+            <a:extLst>
+              <a:ext uri="{FF2B5EF4-FFF2-40B4-BE49-F238E27FC236}">
+                <a16:creationId xmlns:a16="http://schemas.microsoft.com/office/drawing/2014/main" id="{F2EF679C-750C-4CED-A5B1-4A1F655B79C3}"/>
+              </a:ext>
+            </a:extLst>
+          </p:cNvPr>
+          <p:cNvPicPr>
+            <a:picLocks noChangeAspect="1"/>
+          </p:cNvPicPr>
+          <p:nvPr/>
+        </p:nvPicPr>
+        <p:blipFill>
+          <a:blip r:embed="rId12"/>
+          <a:stretch>
+            <a:fillRect/>
+          </a:stretch>
+        </p:blipFill>
+        <p:spPr>
+          <a:xfrm>
+            <a:off x="14246941" y="21182370"/>
+            <a:ext cx="7344697" cy="5552769"/>
+          </a:xfrm>
+          <a:prstGeom prst="rect">
+            <a:avLst/>
+          </a:prstGeom>
+        </p:spPr>
+      </p:pic>
+      <p:pic>
+        <p:nvPicPr>
+          <p:cNvPr id="10" name="Picture 13" descr="Chart, line chart&#10;&#10;Description automatically generated">
+            <a:extLst>
+              <a:ext uri="{FF2B5EF4-FFF2-40B4-BE49-F238E27FC236}">
+                <a16:creationId xmlns:a16="http://schemas.microsoft.com/office/drawing/2014/main" id="{78B1034D-DD94-4DA9-90DC-89BC7B0F492E}"/>
+              </a:ext>
+            </a:extLst>
+          </p:cNvPr>
+          <p:cNvPicPr>
+            <a:picLocks noChangeAspect="1"/>
+          </p:cNvPicPr>
+          <p:nvPr/>
+        </p:nvPicPr>
+        <p:blipFill>
+          <a:blip r:embed="rId13"/>
+          <a:stretch>
+            <a:fillRect/>
+          </a:stretch>
+        </p:blipFill>
+        <p:spPr>
+          <a:xfrm>
+            <a:off x="23936632" y="21182371"/>
+            <a:ext cx="7388942" cy="5420032"/>
+          </a:xfrm>
+          <a:prstGeom prst="rect">
+            <a:avLst/>
+          </a:prstGeom>
         </p:spPr>
       </p:pic>
     </p:spTree>

</xml_diff>

<commit_message>
updated PPO plots for doc
</commit_message>
<xml_diff>
--- a/final/presentation_poster.pptx
+++ b/final/presentation_poster.pptx
@@ -2991,7 +2991,7 @@
         </p:nvSpPr>
         <p:spPr>
           <a:xfrm>
-            <a:off x="12370197" y="5954776"/>
+            <a:off x="12239569" y="5954776"/>
             <a:ext cx="20813200" cy="12937237"/>
           </a:xfrm>
           <a:prstGeom prst="roundRect">
@@ -3075,7 +3075,7 @@
         </p:nvSpPr>
         <p:spPr>
           <a:xfrm>
-            <a:off x="273896" y="5910621"/>
+            <a:off x="175925" y="5910621"/>
             <a:ext cx="12005400" cy="9741941"/>
           </a:xfrm>
           <a:prstGeom prst="roundRect">
@@ -3398,7 +3398,7 @@
         </p:nvSpPr>
         <p:spPr>
           <a:xfrm>
-            <a:off x="18768484" y="10642821"/>
+            <a:off x="18637856" y="10642821"/>
             <a:ext cx="2209799" cy="461699"/>
           </a:xfrm>
           <a:prstGeom prst="rect">
@@ -3451,7 +3451,7 @@
         </p:nvSpPr>
         <p:spPr>
           <a:xfrm>
-            <a:off x="1307550" y="19927475"/>
+            <a:off x="1242236" y="19927475"/>
             <a:ext cx="3000000" cy="3000000"/>
           </a:xfrm>
           <a:prstGeom prst="rect">
@@ -3504,7 +3504,7 @@
         </p:nvSpPr>
         <p:spPr>
           <a:xfrm>
-            <a:off x="322121" y="15652562"/>
+            <a:off x="136287" y="15652562"/>
             <a:ext cx="12006029" cy="8641982"/>
           </a:xfrm>
           <a:prstGeom prst="roundRect">
@@ -3633,7 +3633,7 @@
         </p:nvSpPr>
         <p:spPr>
           <a:xfrm>
-            <a:off x="217603" y="24294544"/>
+            <a:off x="152289" y="24294544"/>
             <a:ext cx="11982982" cy="8409362"/>
           </a:xfrm>
           <a:prstGeom prst="roundRect">
@@ -4243,7 +4243,7 @@
         </p:nvSpPr>
         <p:spPr>
           <a:xfrm>
-            <a:off x="12328150" y="18936612"/>
+            <a:off x="12197522" y="18936612"/>
             <a:ext cx="20862054" cy="13767237"/>
           </a:xfrm>
           <a:prstGeom prst="roundRect">
@@ -4646,7 +4646,7 @@
         </p:blipFill>
         <p:spPr>
           <a:xfrm>
-            <a:off x="1969864" y="26224990"/>
+            <a:off x="1904550" y="26224990"/>
             <a:ext cx="3656336" cy="5134942"/>
           </a:xfrm>
           <a:prstGeom prst="rect">
@@ -4711,7 +4711,7 @@
         </p:blipFill>
         <p:spPr>
           <a:xfrm>
-            <a:off x="1150374" y="17148136"/>
+            <a:off x="1139598" y="17148136"/>
             <a:ext cx="9999406" cy="6497766"/>
           </a:xfrm>
           <a:prstGeom prst="rect">
@@ -4741,7 +4741,7 @@
         </p:blipFill>
         <p:spPr>
           <a:xfrm>
-            <a:off x="6194322" y="26241529"/>
+            <a:off x="6129008" y="26241529"/>
             <a:ext cx="4601496" cy="5124142"/>
           </a:xfrm>
           <a:prstGeom prst="rect">
@@ -4771,7 +4771,7 @@
         </p:blipFill>
         <p:spPr>
           <a:xfrm>
-            <a:off x="38431340" y="22429553"/>
+            <a:off x="38366026" y="22094709"/>
             <a:ext cx="4967269" cy="3725452"/>
           </a:xfrm>
           <a:prstGeom prst="rect">
@@ -4801,7 +4801,7 @@
         </p:blipFill>
         <p:spPr>
           <a:xfrm>
-            <a:off x="33714668" y="21768168"/>
+            <a:off x="33649354" y="21278313"/>
             <a:ext cx="5286358" cy="5358245"/>
           </a:xfrm>
           <a:prstGeom prst="rect">
@@ -4838,7 +4838,7 @@
         </p:blipFill>
         <p:spPr bwMode="auto">
           <a:xfrm>
-            <a:off x="13003963" y="20843209"/>
+            <a:off x="12873335" y="20843209"/>
             <a:ext cx="9699296" cy="6825666"/>
           </a:xfrm>
           <a:prstGeom prst="rect">
@@ -4878,7 +4878,7 @@
         </p:blipFill>
         <p:spPr>
           <a:xfrm>
-            <a:off x="23499592" y="26278438"/>
+            <a:off x="23368964" y="26278438"/>
             <a:ext cx="8079167" cy="6108046"/>
           </a:xfrm>
           <a:prstGeom prst="rect">
@@ -4908,7 +4908,7 @@
         </p:blipFill>
         <p:spPr>
           <a:xfrm>
-            <a:off x="23439135" y="20842976"/>
+            <a:off x="23308507" y="20842976"/>
             <a:ext cx="8127836" cy="5962035"/>
           </a:xfrm>
           <a:prstGeom prst="rect">
@@ -4930,7 +4930,7 @@
         </p:nvSpPr>
         <p:spPr>
           <a:xfrm>
-            <a:off x="12655681" y="7905972"/>
+            <a:off x="12525053" y="7905972"/>
             <a:ext cx="9861342" cy="3170099"/>
           </a:xfrm>
           <a:prstGeom prst="rect">
@@ -4965,7 +4965,7 @@
         </p:nvSpPr>
         <p:spPr>
           <a:xfrm>
-            <a:off x="23343391" y="15551319"/>
+            <a:off x="23212763" y="15551319"/>
             <a:ext cx="9377382" cy="2585323"/>
           </a:xfrm>
           <a:prstGeom prst="rect">
@@ -5008,7 +5008,7 @@
         </p:blipFill>
         <p:spPr>
           <a:xfrm>
-            <a:off x="12500613" y="11257492"/>
+            <a:off x="12369985" y="11257492"/>
             <a:ext cx="10265628" cy="7569881"/>
           </a:xfrm>
           <a:prstGeom prst="rect">
@@ -5038,7 +5038,7 @@
         </p:blipFill>
         <p:spPr>
           <a:xfrm>
-            <a:off x="22612484" y="7726972"/>
+            <a:off x="22481856" y="7726972"/>
             <a:ext cx="10265628" cy="7569881"/>
           </a:xfrm>
           <a:prstGeom prst="rect">

</xml_diff>

<commit_message>
Updated with PPO stats'
</commit_message>
<xml_diff>
--- a/final/presentation_poster.pptx
+++ b/final/presentation_poster.pptx
@@ -237,37 +237,9 @@
 <p1510:revInfo xmlns:a="http://schemas.openxmlformats.org/drawingml/2006/main" xmlns:r="http://schemas.openxmlformats.org/officeDocument/2006/relationships" xmlns:p1510="http://schemas.microsoft.com/office/powerpoint/2015/10/main">
   <p1510:revLst>
     <p1510:client id="{966A8B95-43F3-278D-101C-CCD05A2D0637}" v="206" dt="2020-12-09T14:23:19.403"/>
+    <p1510:client id="{F3109F48-47C3-897D-2C50-1A480B09730B}" v="18" dt="2020-12-10T03:26:07.441"/>
   </p1510:revLst>
 </p1510:revInfo>
-</file>
-
-<file path=ppt/changesInfos/changesInfo1.xml><?xml version="1.0" encoding="utf-8"?>
-<pc:chgInfo xmlns:a="http://schemas.openxmlformats.org/drawingml/2006/main" xmlns:r="http://schemas.openxmlformats.org/officeDocument/2006/relationships" xmlns:ac="http://schemas.microsoft.com/office/drawing/2013/main/command" xmlns:pc="http://schemas.microsoft.com/office/powerpoint/2013/main/command">
-  <pc:docChgLst>
-    <pc:chgData name="Ben Hershey" userId="c68cb37959f34d75" providerId="LiveId" clId="{490992E0-5D96-4DBC-8A45-0ADFC879010D}"/>
-    <pc:docChg chg="modSld">
-      <pc:chgData name="Ben Hershey" userId="c68cb37959f34d75" providerId="LiveId" clId="{490992E0-5D96-4DBC-8A45-0ADFC879010D}" dt="2020-12-10T02:21:41.752" v="1" actId="20577"/>
-      <pc:docMkLst>
-        <pc:docMk/>
-      </pc:docMkLst>
-      <pc:sldChg chg="modSp mod">
-        <pc:chgData name="Ben Hershey" userId="c68cb37959f34d75" providerId="LiveId" clId="{490992E0-5D96-4DBC-8A45-0ADFC879010D}" dt="2020-12-10T02:21:41.752" v="1" actId="20577"/>
-        <pc:sldMkLst>
-          <pc:docMk/>
-          <pc:sldMk cId="0" sldId="256"/>
-        </pc:sldMkLst>
-        <pc:spChg chg="mod">
-          <ac:chgData name="Ben Hershey" userId="c68cb37959f34d75" providerId="LiveId" clId="{490992E0-5D96-4DBC-8A45-0ADFC879010D}" dt="2020-12-10T02:21:41.752" v="1" actId="20577"/>
-          <ac:spMkLst>
-            <pc:docMk/>
-            <pc:sldMk cId="0" sldId="256"/>
-            <ac:spMk id="4" creationId="{49955954-7F42-4497-90F9-232BC62ED741}"/>
-          </ac:spMkLst>
-        </pc:spChg>
-      </pc:sldChg>
-    </pc:docChg>
-  </pc:docChgLst>
-</pc:chgInfo>
 </file>
 
 <file path=ppt/notesMasters/notesMaster1.xml><?xml version="1.0" encoding="utf-8"?>
@@ -4758,7 +4730,7 @@
         </p:blipFill>
         <p:spPr>
           <a:xfrm>
-            <a:off x="1139598" y="17148136"/>
+            <a:off x="1139598" y="17546343"/>
             <a:ext cx="9999406" cy="6497766"/>
           </a:xfrm>
           <a:prstGeom prst="rect">
@@ -4925,38 +4897,8 @@
         </p:blipFill>
         <p:spPr>
           <a:xfrm>
-            <a:off x="23371886" y="26531839"/>
-            <a:ext cx="8079167" cy="6108046"/>
-          </a:xfrm>
-          <a:prstGeom prst="rect">
-            <a:avLst/>
-          </a:prstGeom>
-        </p:spPr>
-      </p:pic>
-      <p:pic>
-        <p:nvPicPr>
-          <p:cNvPr id="10" name="Picture 13" descr="Chart, line chart&#10;&#10;Description automatically generated">
-            <a:extLst>
-              <a:ext uri="{FF2B5EF4-FFF2-40B4-BE49-F238E27FC236}">
-                <a16:creationId xmlns:a16="http://schemas.microsoft.com/office/drawing/2014/main" id="{78B1034D-DD94-4DA9-90DC-89BC7B0F492E}"/>
-              </a:ext>
-            </a:extLst>
-          </p:cNvPr>
-          <p:cNvPicPr>
-            <a:picLocks noChangeAspect="1"/>
-          </p:cNvPicPr>
-          <p:nvPr/>
-        </p:nvPicPr>
-        <p:blipFill>
-          <a:blip r:embed="rId11"/>
-          <a:stretch>
-            <a:fillRect/>
-          </a:stretch>
-        </p:blipFill>
-        <p:spPr>
-          <a:xfrm>
-            <a:off x="23347551" y="20883849"/>
-            <a:ext cx="8127836" cy="5962035"/>
+            <a:off x="23371886" y="27372497"/>
+            <a:ext cx="8344640" cy="5134654"/>
           </a:xfrm>
           <a:prstGeom prst="rect">
             <a:avLst/>
@@ -5048,7 +4990,7 @@
           <p:nvPr/>
         </p:nvPicPr>
         <p:blipFill>
-          <a:blip r:embed="rId12"/>
+          <a:blip r:embed="rId11"/>
           <a:stretch>
             <a:fillRect/>
           </a:stretch>
@@ -5078,7 +5020,7 @@
           <p:nvPr/>
         </p:nvPicPr>
         <p:blipFill>
-          <a:blip r:embed="rId13"/>
+          <a:blip r:embed="rId12"/>
           <a:stretch>
             <a:fillRect/>
           </a:stretch>
@@ -5087,6 +5029,36 @@
           <a:xfrm>
             <a:off x="22481856" y="7726972"/>
             <a:ext cx="10265628" cy="7569881"/>
+          </a:xfrm>
+          <a:prstGeom prst="rect">
+            <a:avLst/>
+          </a:prstGeom>
+        </p:spPr>
+      </p:pic>
+      <p:pic>
+        <p:nvPicPr>
+          <p:cNvPr id="5" name="Picture 13" descr="Chart, line chart&#10;&#10;Description automatically generated">
+            <a:extLst>
+              <a:ext uri="{FF2B5EF4-FFF2-40B4-BE49-F238E27FC236}">
+                <a16:creationId xmlns:a16="http://schemas.microsoft.com/office/drawing/2014/main" id="{8F1EE97D-2419-437F-8BB3-F3BB50F6E151}"/>
+              </a:ext>
+            </a:extLst>
+          </p:cNvPr>
+          <p:cNvPicPr>
+            <a:picLocks noChangeAspect="1"/>
+          </p:cNvPicPr>
+          <p:nvPr/>
+        </p:nvPicPr>
+        <p:blipFill>
+          <a:blip r:embed="rId13"/>
+          <a:stretch>
+            <a:fillRect/>
+          </a:stretch>
+        </p:blipFill>
+        <p:spPr>
+          <a:xfrm>
+            <a:off x="23361446" y="20872654"/>
+            <a:ext cx="9247238" cy="6526161"/>
           </a:xfrm>
           <a:prstGeom prst="rect">
             <a:avLst/>

</xml_diff>